<commit_message>
revised for hubitat composite driver model
</commit_message>
<xml_diff>
--- a/Architecture Flowchart.pptx
+++ b/Architecture Flowchart.pptx
@@ -255,7 +255,7 @@
           <a:p>
             <a:fld id="{B2927C94-1AF9-4A63-8C5E-3EA8D5069965}" type="datetimeFigureOut">
               <a:rPr lang="en-US" smtClean="0"/>
-              <a:t>2/9/2018</a:t>
+              <a:t>6/5/2018</a:t>
             </a:fld>
             <a:endParaRPr lang="en-US"/>
           </a:p>
@@ -425,7 +425,7 @@
           <a:p>
             <a:fld id="{B2927C94-1AF9-4A63-8C5E-3EA8D5069965}" type="datetimeFigureOut">
               <a:rPr lang="en-US" smtClean="0"/>
-              <a:t>2/9/2018</a:t>
+              <a:t>6/5/2018</a:t>
             </a:fld>
             <a:endParaRPr lang="en-US"/>
           </a:p>
@@ -605,7 +605,7 @@
           <a:p>
             <a:fld id="{B2927C94-1AF9-4A63-8C5E-3EA8D5069965}" type="datetimeFigureOut">
               <a:rPr lang="en-US" smtClean="0"/>
-              <a:t>2/9/2018</a:t>
+              <a:t>6/5/2018</a:t>
             </a:fld>
             <a:endParaRPr lang="en-US"/>
           </a:p>
@@ -775,7 +775,7 @@
           <a:p>
             <a:fld id="{B2927C94-1AF9-4A63-8C5E-3EA8D5069965}" type="datetimeFigureOut">
               <a:rPr lang="en-US" smtClean="0"/>
-              <a:t>2/9/2018</a:t>
+              <a:t>6/5/2018</a:t>
             </a:fld>
             <a:endParaRPr lang="en-US"/>
           </a:p>
@@ -1021,7 +1021,7 @@
           <a:p>
             <a:fld id="{B2927C94-1AF9-4A63-8C5E-3EA8D5069965}" type="datetimeFigureOut">
               <a:rPr lang="en-US" smtClean="0"/>
-              <a:t>2/9/2018</a:t>
+              <a:t>6/5/2018</a:t>
             </a:fld>
             <a:endParaRPr lang="en-US"/>
           </a:p>
@@ -1253,7 +1253,7 @@
           <a:p>
             <a:fld id="{B2927C94-1AF9-4A63-8C5E-3EA8D5069965}" type="datetimeFigureOut">
               <a:rPr lang="en-US" smtClean="0"/>
-              <a:t>2/9/2018</a:t>
+              <a:t>6/5/2018</a:t>
             </a:fld>
             <a:endParaRPr lang="en-US"/>
           </a:p>
@@ -1620,7 +1620,7 @@
           <a:p>
             <a:fld id="{B2927C94-1AF9-4A63-8C5E-3EA8D5069965}" type="datetimeFigureOut">
               <a:rPr lang="en-US" smtClean="0"/>
-              <a:t>2/9/2018</a:t>
+              <a:t>6/5/2018</a:t>
             </a:fld>
             <a:endParaRPr lang="en-US"/>
           </a:p>
@@ -1738,7 +1738,7 @@
           <a:p>
             <a:fld id="{B2927C94-1AF9-4A63-8C5E-3EA8D5069965}" type="datetimeFigureOut">
               <a:rPr lang="en-US" smtClean="0"/>
-              <a:t>2/9/2018</a:t>
+              <a:t>6/5/2018</a:t>
             </a:fld>
             <a:endParaRPr lang="en-US"/>
           </a:p>
@@ -1833,7 +1833,7 @@
           <a:p>
             <a:fld id="{B2927C94-1AF9-4A63-8C5E-3EA8D5069965}" type="datetimeFigureOut">
               <a:rPr lang="en-US" smtClean="0"/>
-              <a:t>2/9/2018</a:t>
+              <a:t>6/5/2018</a:t>
             </a:fld>
             <a:endParaRPr lang="en-US"/>
           </a:p>
@@ -2110,7 +2110,7 @@
           <a:p>
             <a:fld id="{B2927C94-1AF9-4A63-8C5E-3EA8D5069965}" type="datetimeFigureOut">
               <a:rPr lang="en-US" smtClean="0"/>
-              <a:t>2/9/2018</a:t>
+              <a:t>6/5/2018</a:t>
             </a:fld>
             <a:endParaRPr lang="en-US"/>
           </a:p>
@@ -2363,7 +2363,7 @@
           <a:p>
             <a:fld id="{B2927C94-1AF9-4A63-8C5E-3EA8D5069965}" type="datetimeFigureOut">
               <a:rPr lang="en-US" smtClean="0"/>
-              <a:t>2/9/2018</a:t>
+              <a:t>6/5/2018</a:t>
             </a:fld>
             <a:endParaRPr lang="en-US"/>
           </a:p>
@@ -2576,7 +2576,7 @@
           <a:p>
             <a:fld id="{B2927C94-1AF9-4A63-8C5E-3EA8D5069965}" type="datetimeFigureOut">
               <a:rPr lang="en-US" smtClean="0"/>
-              <a:t>2/9/2018</a:t>
+              <a:t>6/5/2018</a:t>
             </a:fld>
             <a:endParaRPr lang="en-US"/>
           </a:p>
@@ -4643,7 +4643,7 @@
         </p:nvSpPr>
         <p:spPr>
           <a:xfrm>
-            <a:off x="9982200" y="3874261"/>
+            <a:off x="9869583" y="3088809"/>
             <a:ext cx="1655805" cy="988541"/>
           </a:xfrm>
           <a:prstGeom prst="roundRect">
@@ -4693,7 +4693,7 @@
         </p:nvSpPr>
         <p:spPr>
           <a:xfrm>
-            <a:off x="10113537" y="4033660"/>
+            <a:off x="10000920" y="3248208"/>
             <a:ext cx="1655805" cy="988541"/>
           </a:xfrm>
           <a:prstGeom prst="roundRect">
@@ -4745,7 +4745,7 @@
         </p:nvSpPr>
         <p:spPr>
           <a:xfrm>
-            <a:off x="10244874" y="4193059"/>
+            <a:off x="10144897" y="3428999"/>
             <a:ext cx="1655805" cy="988541"/>
           </a:xfrm>
           <a:prstGeom prst="roundRect">
@@ -4810,14 +4810,14 @@
           <p:cNvPr id="37" name="Straight Arrow Connector 36"/>
           <p:cNvCxnSpPr>
             <a:stCxn id="17" idx="3"/>
-            <a:endCxn id="34" idx="0"/>
+            <a:endCxn id="36" idx="0"/>
           </p:cNvCxnSpPr>
           <p:nvPr/>
         </p:nvCxnSpPr>
         <p:spPr>
           <a:xfrm>
             <a:off x="10114006" y="1944130"/>
-            <a:ext cx="696097" cy="606718"/>
+            <a:ext cx="583480" cy="1144679"/>
           </a:xfrm>
           <a:prstGeom prst="straightConnector1">
             <a:avLst/>
@@ -4895,11 +4895,6 @@
               </a:rPr>
               <a:t>Apps</a:t>
             </a:r>
-            <a:endParaRPr lang="en-US" dirty="0" smtClean="0">
-              <a:solidFill>
-                <a:schemeClr val="tx1"/>
-              </a:solidFill>
-            </a:endParaRPr>
           </a:p>
           <a:p>
             <a:pPr algn="ctr"/>
@@ -4909,23 +4904,7 @@
                   <a:schemeClr val="tx1"/>
                 </a:solidFill>
               </a:rPr>
-              <a:t>(</a:t>
-            </a:r>
-            <a:r>
-              <a:rPr lang="en-US" dirty="0" smtClean="0">
-                <a:solidFill>
-                  <a:schemeClr val="tx1"/>
-                </a:solidFill>
-              </a:rPr>
-              <a:t>Rule Machine, Simple Lighting,</a:t>
-            </a:r>
-            <a:r>
-              <a:rPr lang="en-US" dirty="0" smtClean="0">
-                <a:solidFill>
-                  <a:schemeClr val="tx1"/>
-                </a:solidFill>
-              </a:rPr>
-              <a:t> </a:t>
+              <a:t>(Rule Machine, Simple Lighting, </a:t>
             </a:r>
             <a:r>
               <a:rPr lang="en-US" dirty="0" err="1" smtClean="0">
@@ -5003,8 +4982,8 @@
         </p:nvCxnSpPr>
         <p:spPr>
           <a:xfrm flipH="1">
-            <a:off x="9296400" y="5181600"/>
-            <a:ext cx="1776377" cy="533400"/>
+            <a:off x="9296400" y="4417540"/>
+            <a:ext cx="1676400" cy="1297460"/>
           </a:xfrm>
           <a:prstGeom prst="straightConnector1">
             <a:avLst/>
@@ -5070,8 +5049,8 @@
           <p:nvPr/>
         </p:nvSpPr>
         <p:spPr>
-          <a:xfrm rot="20594091">
-            <a:off x="9840908" y="5340307"/>
+          <a:xfrm rot="19276671">
+            <a:off x="9722303" y="4977044"/>
             <a:ext cx="1566003" cy="307777"/>
           </a:xfrm>
           <a:prstGeom prst="rect">
@@ -5323,7 +5302,23 @@
                   <a:schemeClr val="tx1"/>
                 </a:solidFill>
               </a:rPr>
-              <a:t> Bridge Device</a:t>
+              <a:t> </a:t>
+            </a:r>
+            <a:r>
+              <a:rPr lang="en-US" dirty="0" smtClean="0">
+                <a:solidFill>
+                  <a:schemeClr val="tx1"/>
+                </a:solidFill>
+              </a:rPr>
+              <a:t>Parent </a:t>
+            </a:r>
+            <a:r>
+              <a:rPr lang="en-US" dirty="0" smtClean="0">
+                <a:solidFill>
+                  <a:schemeClr val="tx1"/>
+                </a:solidFill>
+              </a:rPr>
+              <a:t>Device</a:t>
             </a:r>
             <a:endParaRPr lang="en-US" dirty="0">
               <a:solidFill>
@@ -5363,112 +5358,6 @@
           </a:p>
         </p:txBody>
       </p:sp>
-      <p:sp>
-        <p:nvSpPr>
-          <p:cNvPr id="34" name="Rounded Rectangle 33"/>
-          <p:cNvSpPr/>
-          <p:nvPr/>
-        </p:nvSpPr>
-        <p:spPr>
-          <a:xfrm>
-            <a:off x="9982200" y="2550848"/>
-            <a:ext cx="1655805" cy="988541"/>
-          </a:xfrm>
-          <a:prstGeom prst="roundRect">
-            <a:avLst/>
-          </a:prstGeom>
-          <a:noFill/>
-          <a:ln w="25400">
-            <a:solidFill>
-              <a:schemeClr val="tx2"/>
-            </a:solidFill>
-          </a:ln>
-        </p:spPr>
-        <p:style>
-          <a:lnRef idx="2">
-            <a:schemeClr val="accent1">
-              <a:shade val="50000"/>
-            </a:schemeClr>
-          </a:lnRef>
-          <a:fillRef idx="1">
-            <a:schemeClr val="accent1"/>
-          </a:fillRef>
-          <a:effectRef idx="0">
-            <a:schemeClr val="accent1"/>
-          </a:effectRef>
-          <a:fontRef idx="minor">
-            <a:schemeClr val="lt1"/>
-          </a:fontRef>
-        </p:style>
-        <p:txBody>
-          <a:bodyPr rtlCol="0" anchor="ctr"/>
-          <a:lstStyle/>
-          <a:p>
-            <a:pPr algn="ctr"/>
-            <a:r>
-              <a:rPr lang="en-US" dirty="0" err="1" smtClean="0">
-                <a:solidFill>
-                  <a:schemeClr val="tx1"/>
-                </a:solidFill>
-              </a:rPr>
-              <a:t>HubDuino</a:t>
-            </a:r>
-            <a:r>
-              <a:rPr lang="en-US" dirty="0" smtClean="0">
-                <a:solidFill>
-                  <a:schemeClr val="tx1"/>
-                </a:solidFill>
-              </a:rPr>
-              <a:t> Service Manager App</a:t>
-            </a:r>
-            <a:endParaRPr lang="en-US" dirty="0">
-              <a:solidFill>
-                <a:schemeClr val="tx1"/>
-              </a:solidFill>
-            </a:endParaRPr>
-          </a:p>
-        </p:txBody>
-      </p:sp>
-      <p:cxnSp>
-        <p:nvCxnSpPr>
-          <p:cNvPr id="38" name="Straight Arrow Connector 37"/>
-          <p:cNvCxnSpPr>
-            <a:stCxn id="34" idx="2"/>
-            <a:endCxn id="36" idx="0"/>
-          </p:cNvCxnSpPr>
-          <p:nvPr/>
-        </p:nvCxnSpPr>
-        <p:spPr>
-          <a:xfrm>
-            <a:off x="10810103" y="3539389"/>
-            <a:ext cx="0" cy="334872"/>
-          </a:xfrm>
-          <a:prstGeom prst="straightConnector1">
-            <a:avLst/>
-          </a:prstGeom>
-          <a:ln w="25400">
-            <a:solidFill>
-              <a:schemeClr val="tx2"/>
-            </a:solidFill>
-            <a:headEnd type="triangle"/>
-            <a:tailEnd type="triangle"/>
-          </a:ln>
-        </p:spPr>
-        <p:style>
-          <a:lnRef idx="1">
-            <a:schemeClr val="accent1"/>
-          </a:lnRef>
-          <a:fillRef idx="0">
-            <a:schemeClr val="accent1"/>
-          </a:fillRef>
-          <a:effectRef idx="0">
-            <a:schemeClr val="accent1"/>
-          </a:effectRef>
-          <a:fontRef idx="minor">
-            <a:schemeClr val="tx1"/>
-          </a:fontRef>
-        </p:style>
-      </p:cxnSp>
     </p:spTree>
     <p:extLst>
       <p:ext uri="{BB962C8B-B14F-4D97-AF65-F5344CB8AC3E}">

</xml_diff>